<commit_message>
Modified stored procedures and created a wrapper procedure to call one of the stored procedures in a transaction format
</commit_message>
<xml_diff>
--- a/RentalCarDatabase-SQL/DataBaseDesign.pptx
+++ b/RentalCarDatabase-SQL/DataBaseDesign.pptx
@@ -112,14 +112,6 @@
     </p:ext>
   </p:extLst>
 </p:presentation>
-</file>
-
-<file path=ppt/revisionInfo.xml><?xml version="1.0" encoding="utf-8"?>
-<p1510:revInfo xmlns:a="http://schemas.openxmlformats.org/drawingml/2006/main" xmlns:r="http://schemas.openxmlformats.org/officeDocument/2006/relationships" xmlns:p1510="http://schemas.microsoft.com/office/powerpoint/2015/10/main">
-  <p1510:revLst>
-    <p1510:client id="{82D7CD04-FEC6-451E-8662-8FDE3E2997FD}" v="48" dt="2024-06-03T00:39:59.232"/>
-  </p1510:revLst>
-</p1510:revInfo>
 </file>
 
 <file path=ppt/changesInfos/changesInfo1.xml><?xml version="1.0" encoding="utf-8"?>
@@ -370,6 +362,45 @@
       </pc:sldChg>
     </pc:docChg>
   </pc:docChgLst>
+  <pc:docChgLst>
+    <pc:chgData name="Vijay Lakshmanan Radhakrishnan" userId="8bb69e61a4d6a761" providerId="LiveId" clId="{124D21D6-1BE1-4D6D-87AB-B926644F8EDE}"/>
+    <pc:docChg chg="modSld">
+      <pc:chgData name="Vijay Lakshmanan Radhakrishnan" userId="8bb69e61a4d6a761" providerId="LiveId" clId="{124D21D6-1BE1-4D6D-87AB-B926644F8EDE}" dt="2024-06-09T21:23:17.085" v="76" actId="20577"/>
+      <pc:docMkLst>
+        <pc:docMk/>
+      </pc:docMkLst>
+      <pc:sldChg chg="modSp mod">
+        <pc:chgData name="Vijay Lakshmanan Radhakrishnan" userId="8bb69e61a4d6a761" providerId="LiveId" clId="{124D21D6-1BE1-4D6D-87AB-B926644F8EDE}" dt="2024-06-09T21:22:38.165" v="26" actId="5793"/>
+        <pc:sldMkLst>
+          <pc:docMk/>
+          <pc:sldMk cId="3124304473" sldId="257"/>
+        </pc:sldMkLst>
+        <pc:spChg chg="mod">
+          <ac:chgData name="Vijay Lakshmanan Radhakrishnan" userId="8bb69e61a4d6a761" providerId="LiveId" clId="{124D21D6-1BE1-4D6D-87AB-B926644F8EDE}" dt="2024-06-09T21:22:38.165" v="26" actId="5793"/>
+          <ac:spMkLst>
+            <pc:docMk/>
+            <pc:sldMk cId="3124304473" sldId="257"/>
+            <ac:spMk id="3" creationId="{34FB332B-67E7-C782-2EFA-61A0B504925F}"/>
+          </ac:spMkLst>
+        </pc:spChg>
+      </pc:sldChg>
+      <pc:sldChg chg="modSp mod">
+        <pc:chgData name="Vijay Lakshmanan Radhakrishnan" userId="8bb69e61a4d6a761" providerId="LiveId" clId="{124D21D6-1BE1-4D6D-87AB-B926644F8EDE}" dt="2024-06-09T21:23:17.085" v="76" actId="20577"/>
+        <pc:sldMkLst>
+          <pc:docMk/>
+          <pc:sldMk cId="1774957905" sldId="258"/>
+        </pc:sldMkLst>
+        <pc:spChg chg="mod">
+          <ac:chgData name="Vijay Lakshmanan Radhakrishnan" userId="8bb69e61a4d6a761" providerId="LiveId" clId="{124D21D6-1BE1-4D6D-87AB-B926644F8EDE}" dt="2024-06-09T21:23:17.085" v="76" actId="20577"/>
+          <ac:spMkLst>
+            <pc:docMk/>
+            <pc:sldMk cId="1774957905" sldId="258"/>
+            <ac:spMk id="3" creationId="{34FB332B-67E7-C782-2EFA-61A0B504925F}"/>
+          </ac:spMkLst>
+        </pc:spChg>
+      </pc:sldChg>
+    </pc:docChg>
+  </pc:docChgLst>
 </pc:chgInfo>
 </file>
 
@@ -520,7 +551,7 @@
           <a:p>
             <a:fld id="{AC5C6269-678C-40E4-8781-5B5C8B5A3042}" type="datetimeFigureOut">
               <a:rPr lang="en-US" smtClean="0"/>
-              <a:t>6/2/2024</a:t>
+              <a:t>6/9/2024</a:t>
             </a:fld>
             <a:endParaRPr lang="en-US"/>
           </a:p>
@@ -718,7 +749,7 @@
           <a:p>
             <a:fld id="{AC5C6269-678C-40E4-8781-5B5C8B5A3042}" type="datetimeFigureOut">
               <a:rPr lang="en-US" smtClean="0"/>
-              <a:t>6/2/2024</a:t>
+              <a:t>6/9/2024</a:t>
             </a:fld>
             <a:endParaRPr lang="en-US"/>
           </a:p>
@@ -926,7 +957,7 @@
           <a:p>
             <a:fld id="{AC5C6269-678C-40E4-8781-5B5C8B5A3042}" type="datetimeFigureOut">
               <a:rPr lang="en-US" smtClean="0"/>
-              <a:t>6/2/2024</a:t>
+              <a:t>6/9/2024</a:t>
             </a:fld>
             <a:endParaRPr lang="en-US"/>
           </a:p>
@@ -1124,7 +1155,7 @@
           <a:p>
             <a:fld id="{AC5C6269-678C-40E4-8781-5B5C8B5A3042}" type="datetimeFigureOut">
               <a:rPr lang="en-US" smtClean="0"/>
-              <a:t>6/2/2024</a:t>
+              <a:t>6/9/2024</a:t>
             </a:fld>
             <a:endParaRPr lang="en-US"/>
           </a:p>
@@ -1399,7 +1430,7 @@
           <a:p>
             <a:fld id="{AC5C6269-678C-40E4-8781-5B5C8B5A3042}" type="datetimeFigureOut">
               <a:rPr lang="en-US" smtClean="0"/>
-              <a:t>6/2/2024</a:t>
+              <a:t>6/9/2024</a:t>
             </a:fld>
             <a:endParaRPr lang="en-US"/>
           </a:p>
@@ -1664,7 +1695,7 @@
           <a:p>
             <a:fld id="{AC5C6269-678C-40E4-8781-5B5C8B5A3042}" type="datetimeFigureOut">
               <a:rPr lang="en-US" smtClean="0"/>
-              <a:t>6/2/2024</a:t>
+              <a:t>6/9/2024</a:t>
             </a:fld>
             <a:endParaRPr lang="en-US"/>
           </a:p>
@@ -2076,7 +2107,7 @@
           <a:p>
             <a:fld id="{AC5C6269-678C-40E4-8781-5B5C8B5A3042}" type="datetimeFigureOut">
               <a:rPr lang="en-US" smtClean="0"/>
-              <a:t>6/2/2024</a:t>
+              <a:t>6/9/2024</a:t>
             </a:fld>
             <a:endParaRPr lang="en-US"/>
           </a:p>
@@ -2217,7 +2248,7 @@
           <a:p>
             <a:fld id="{AC5C6269-678C-40E4-8781-5B5C8B5A3042}" type="datetimeFigureOut">
               <a:rPr lang="en-US" smtClean="0"/>
-              <a:t>6/2/2024</a:t>
+              <a:t>6/9/2024</a:t>
             </a:fld>
             <a:endParaRPr lang="en-US"/>
           </a:p>
@@ -2330,7 +2361,7 @@
           <a:p>
             <a:fld id="{AC5C6269-678C-40E4-8781-5B5C8B5A3042}" type="datetimeFigureOut">
               <a:rPr lang="en-US" smtClean="0"/>
-              <a:t>6/2/2024</a:t>
+              <a:t>6/9/2024</a:t>
             </a:fld>
             <a:endParaRPr lang="en-US"/>
           </a:p>
@@ -2641,7 +2672,7 @@
           <a:p>
             <a:fld id="{AC5C6269-678C-40E4-8781-5B5C8B5A3042}" type="datetimeFigureOut">
               <a:rPr lang="en-US" smtClean="0"/>
-              <a:t>6/2/2024</a:t>
+              <a:t>6/9/2024</a:t>
             </a:fld>
             <a:endParaRPr lang="en-US"/>
           </a:p>
@@ -2929,7 +2960,7 @@
           <a:p>
             <a:fld id="{AC5C6269-678C-40E4-8781-5B5C8B5A3042}" type="datetimeFigureOut">
               <a:rPr lang="en-US" smtClean="0"/>
-              <a:t>6/2/2024</a:t>
+              <a:t>6/9/2024</a:t>
             </a:fld>
             <a:endParaRPr lang="en-US"/>
           </a:p>
@@ -3170,7 +3201,7 @@
           <a:p>
             <a:fld id="{AC5C6269-678C-40E4-8781-5B5C8B5A3042}" type="datetimeFigureOut">
               <a:rPr lang="en-US" smtClean="0"/>
-              <a:t>6/2/2024</a:t>
+              <a:t>6/9/2024</a:t>
             </a:fld>
             <a:endParaRPr lang="en-US"/>
           </a:p>
@@ -5283,7 +5314,7 @@
           <a:p>
             <a:r>
               <a:rPr lang="en-US" dirty="0" err="1"/>
-              <a:t>checkCarAvailability</a:t>
+              <a:t>getCarAvailability</a:t>
             </a:r>
             <a:r>
               <a:rPr lang="en-US" dirty="0"/>
@@ -5340,16 +5371,12 @@
             </a:r>
           </a:p>
           <a:p>
-            <a:pPr lvl="2">
-              <a:buFont typeface="Wingdings" panose="05000000000000000000" pitchFamily="2" charset="2"/>
-              <a:buChar char="à"/>
+            <a:pPr marL="914400" lvl="2" indent="0">
+              <a:buNone/>
             </a:pPr>
-            <a:r>
-              <a:rPr lang="en-US" sz="2800" dirty="0">
-                <a:sym typeface="Wingdings" panose="05000000000000000000" pitchFamily="2" charset="2"/>
-              </a:rPr>
-              <a:t>0 or 1 (TINYINT)</a:t>
-            </a:r>
+            <a:endParaRPr lang="en-US" sz="2800" dirty="0">
+              <a:sym typeface="Wingdings" panose="05000000000000000000" pitchFamily="2" charset="2"/>
+            </a:endParaRPr>
           </a:p>
           <a:p>
             <a:pPr lvl="2">
@@ -5485,23 +5512,7 @@
             </a:r>
           </a:p>
           <a:p>
-            <a:pPr lvl="1">
-              <a:buFont typeface="Wingdings" panose="05000000000000000000" pitchFamily="2" charset="2"/>
-              <a:buChar char="à"/>
-            </a:pPr>
-            <a:r>
-              <a:rPr lang="en-US" sz="3200" dirty="0">
-                <a:sym typeface="Wingdings" panose="05000000000000000000" pitchFamily="2" charset="2"/>
-              </a:rPr>
-              <a:t>0 or 1 (TINYINT)</a:t>
-            </a:r>
-          </a:p>
-          <a:p>
-            <a:pPr lvl="1">
-              <a:buFont typeface="Wingdings" panose="05000000000000000000" pitchFamily="2" charset="2"/>
-              <a:buChar char="à"/>
-            </a:pPr>
-            <a:endParaRPr lang="en-US" sz="3200" dirty="0">
+            <a:endParaRPr lang="en-US" sz="3600" dirty="0">
               <a:sym typeface="Wingdings" panose="05000000000000000000" pitchFamily="2" charset="2"/>
             </a:endParaRPr>
           </a:p>
@@ -5510,7 +5521,7 @@
               <a:rPr lang="en-US" sz="3600" dirty="0" err="1">
                 <a:sym typeface="Wingdings" panose="05000000000000000000" pitchFamily="2" charset="2"/>
               </a:rPr>
-              <a:t>updateCarLocation</a:t>
+              <a:t>fillFullName</a:t>
             </a:r>
             <a:r>
               <a:rPr lang="en-US" sz="3600" dirty="0">
@@ -5519,34 +5530,28 @@
               <a:t>(</a:t>
             </a:r>
             <a:r>
-              <a:rPr lang="en-US" sz="3600" dirty="0" err="1">
+              <a:rPr lang="en-US" sz="3600">
                 <a:sym typeface="Wingdings" panose="05000000000000000000" pitchFamily="2" charset="2"/>
               </a:rPr>
-              <a:t>Car_ID,Location</a:t>
-            </a:r>
-            <a:r>
-              <a:rPr lang="en-US" sz="3600" dirty="0">
-                <a:sym typeface="Wingdings" panose="05000000000000000000" pitchFamily="2" charset="2"/>
-              </a:rPr>
-              <a:t>)</a:t>
-            </a:r>
-          </a:p>
-          <a:p>
-            <a:pPr marL="457200" lvl="1" indent="0">
-              <a:buNone/>
-            </a:pPr>
-            <a:r>
-              <a:rPr lang="en-US" sz="3200">
-                <a:sym typeface="Wingdings" panose="05000000000000000000" pitchFamily="2" charset="2"/>
-              </a:rPr>
-              <a:t> 0 or 1 (TINYINT)</a:t>
-            </a:r>
-            <a:endParaRPr lang="en-US" sz="3200" dirty="0">
+              <a:t>Customer_ID)</a:t>
+            </a:r>
+            <a:endParaRPr lang="en-US" sz="3600" dirty="0">
               <a:sym typeface="Wingdings" panose="05000000000000000000" pitchFamily="2" charset="2"/>
             </a:endParaRPr>
           </a:p>
           <a:p>
+            <a:pPr marL="457200" lvl="1" indent="0">
+              <a:buNone/>
+            </a:pPr>
             <a:endParaRPr lang="en-US" sz="3600" dirty="0">
+              <a:sym typeface="Wingdings" panose="05000000000000000000" pitchFamily="2" charset="2"/>
+            </a:endParaRPr>
+          </a:p>
+          <a:p>
+            <a:pPr marL="457200" lvl="1" indent="0">
+              <a:buNone/>
+            </a:pPr>
+            <a:endParaRPr lang="en-US" sz="3200" dirty="0">
               <a:sym typeface="Wingdings" panose="05000000000000000000" pitchFamily="2" charset="2"/>
             </a:endParaRPr>
           </a:p>

</xml_diff>